<commit_message>
Finished off the interfaces and implemented the Neuron
</commit_message>
<xml_diff>
--- a/NeuroOCR-DevelopmentDocumentation.pptx
+++ b/NeuroOCR-DevelopmentDocumentation.pptx
@@ -16,6 +16,20 @@
     <p:sldId id="266" r:id="rId10"/>
     <p:sldId id="267" r:id="rId11"/>
     <p:sldId id="268" r:id="rId12"/>
+    <p:sldId id="269" r:id="rId13"/>
+    <p:sldId id="270" r:id="rId14"/>
+    <p:sldId id="271" r:id="rId15"/>
+    <p:sldId id="272" r:id="rId16"/>
+    <p:sldId id="273" r:id="rId17"/>
+    <p:sldId id="274" r:id="rId18"/>
+    <p:sldId id="275" r:id="rId19"/>
+    <p:sldId id="276" r:id="rId20"/>
+    <p:sldId id="277" r:id="rId21"/>
+    <p:sldId id="278" r:id="rId22"/>
+    <p:sldId id="279" r:id="rId23"/>
+    <p:sldId id="280" r:id="rId24"/>
+    <p:sldId id="281" r:id="rId25"/>
+    <p:sldId id="282" r:id="rId26"/>
   </p:sldIdLst>
   <p:sldSz cx="12192000" cy="6858000"/>
   <p:notesSz cx="6858000" cy="9144000"/>
@@ -114,6 +128,11 @@
       </a:defRPr>
     </a:lvl9pPr>
   </p:defaultTextStyle>
+  <p:extLst>
+    <p:ext uri="{EFAFB233-063F-42B5-8137-9DF3F51BA10A}">
+      <p15:sldGuideLst xmlns:p15="http://schemas.microsoft.com/office/powerpoint/2012/main"/>
+    </p:ext>
+  </p:extLst>
 </p:presentation>
 </file>
 
@@ -248,7 +267,7 @@
           <a:p>
             <a:fld id="{2753E5DD-2A8F-4475-94D0-56FB72D1633D}" type="datetimeFigureOut">
               <a:rPr lang="en-GB" smtClean="0"/>
-              <a:t>17/06/2016</a:t>
+              <a:t>20/06/2016</a:t>
             </a:fld>
             <a:endParaRPr lang="en-GB"/>
           </a:p>
@@ -418,7 +437,7 @@
           <a:p>
             <a:fld id="{2753E5DD-2A8F-4475-94D0-56FB72D1633D}" type="datetimeFigureOut">
               <a:rPr lang="en-GB" smtClean="0"/>
-              <a:t>17/06/2016</a:t>
+              <a:t>20/06/2016</a:t>
             </a:fld>
             <a:endParaRPr lang="en-GB"/>
           </a:p>
@@ -598,7 +617,7 @@
           <a:p>
             <a:fld id="{2753E5DD-2A8F-4475-94D0-56FB72D1633D}" type="datetimeFigureOut">
               <a:rPr lang="en-GB" smtClean="0"/>
-              <a:t>17/06/2016</a:t>
+              <a:t>20/06/2016</a:t>
             </a:fld>
             <a:endParaRPr lang="en-GB"/>
           </a:p>
@@ -768,7 +787,7 @@
           <a:p>
             <a:fld id="{2753E5DD-2A8F-4475-94D0-56FB72D1633D}" type="datetimeFigureOut">
               <a:rPr lang="en-GB" smtClean="0"/>
-              <a:t>17/06/2016</a:t>
+              <a:t>20/06/2016</a:t>
             </a:fld>
             <a:endParaRPr lang="en-GB"/>
           </a:p>
@@ -1014,7 +1033,7 @@
           <a:p>
             <a:fld id="{2753E5DD-2A8F-4475-94D0-56FB72D1633D}" type="datetimeFigureOut">
               <a:rPr lang="en-GB" smtClean="0"/>
-              <a:t>17/06/2016</a:t>
+              <a:t>20/06/2016</a:t>
             </a:fld>
             <a:endParaRPr lang="en-GB"/>
           </a:p>
@@ -1246,7 +1265,7 @@
           <a:p>
             <a:fld id="{2753E5DD-2A8F-4475-94D0-56FB72D1633D}" type="datetimeFigureOut">
               <a:rPr lang="en-GB" smtClean="0"/>
-              <a:t>17/06/2016</a:t>
+              <a:t>20/06/2016</a:t>
             </a:fld>
             <a:endParaRPr lang="en-GB"/>
           </a:p>
@@ -1613,7 +1632,7 @@
           <a:p>
             <a:fld id="{2753E5DD-2A8F-4475-94D0-56FB72D1633D}" type="datetimeFigureOut">
               <a:rPr lang="en-GB" smtClean="0"/>
-              <a:t>17/06/2016</a:t>
+              <a:t>20/06/2016</a:t>
             </a:fld>
             <a:endParaRPr lang="en-GB"/>
           </a:p>
@@ -1731,7 +1750,7 @@
           <a:p>
             <a:fld id="{2753E5DD-2A8F-4475-94D0-56FB72D1633D}" type="datetimeFigureOut">
               <a:rPr lang="en-GB" smtClean="0"/>
-              <a:t>17/06/2016</a:t>
+              <a:t>20/06/2016</a:t>
             </a:fld>
             <a:endParaRPr lang="en-GB"/>
           </a:p>
@@ -1826,7 +1845,7 @@
           <a:p>
             <a:fld id="{2753E5DD-2A8F-4475-94D0-56FB72D1633D}" type="datetimeFigureOut">
               <a:rPr lang="en-GB" smtClean="0"/>
-              <a:t>17/06/2016</a:t>
+              <a:t>20/06/2016</a:t>
             </a:fld>
             <a:endParaRPr lang="en-GB"/>
           </a:p>
@@ -2103,7 +2122,7 @@
           <a:p>
             <a:fld id="{2753E5DD-2A8F-4475-94D0-56FB72D1633D}" type="datetimeFigureOut">
               <a:rPr lang="en-GB" smtClean="0"/>
-              <a:t>17/06/2016</a:t>
+              <a:t>20/06/2016</a:t>
             </a:fld>
             <a:endParaRPr lang="en-GB"/>
           </a:p>
@@ -2356,7 +2375,7 @@
           <a:p>
             <a:fld id="{2753E5DD-2A8F-4475-94D0-56FB72D1633D}" type="datetimeFigureOut">
               <a:rPr lang="en-GB" smtClean="0"/>
-              <a:t>17/06/2016</a:t>
+              <a:t>20/06/2016</a:t>
             </a:fld>
             <a:endParaRPr lang="en-GB"/>
           </a:p>
@@ -2569,7 +2588,7 @@
           <a:p>
             <a:fld id="{2753E5DD-2A8F-4475-94D0-56FB72D1633D}" type="datetimeFigureOut">
               <a:rPr lang="en-GB" smtClean="0"/>
-              <a:t>17/06/2016</a:t>
+              <a:t>20/06/2016</a:t>
             </a:fld>
             <a:endParaRPr lang="en-GB"/>
           </a:p>
@@ -3246,7 +3265,19 @@
               <a:rPr lang="en-GB" dirty="0" smtClean="0">
                 <a:sym typeface="Wingdings" panose="05000000000000000000" pitchFamily="2" charset="2"/>
               </a:rPr>
-              <a:t>Here’s the network factory. In the </a:t>
+              <a:t>Here’s the network </a:t>
+            </a:r>
+            <a:r>
+              <a:rPr lang="en-GB" dirty="0" smtClean="0">
+                <a:sym typeface="Wingdings" panose="05000000000000000000" pitchFamily="2" charset="2"/>
+              </a:rPr>
+              <a:t>factory interface. </a:t>
+            </a:r>
+            <a:r>
+              <a:rPr lang="en-GB" dirty="0" smtClean="0">
+                <a:sym typeface="Wingdings" panose="05000000000000000000" pitchFamily="2" charset="2"/>
+              </a:rPr>
+              <a:t>In the </a:t>
             </a:r>
             <a:r>
               <a:rPr lang="en-GB" dirty="0" err="1" smtClean="0">
@@ -3282,7 +3313,19 @@
               <a:rPr lang="en-GB" dirty="0" smtClean="0">
                 <a:sym typeface="Wingdings" panose="05000000000000000000" pitchFamily="2" charset="2"/>
               </a:rPr>
-              <a:t> = 32bit, Long = 64bit). As you can see, the neural network instantiated by this will not be multi-dimensional. I’ll cross that bridge when I come to it</a:t>
+              <a:t> = 32bit, Long = 64bit). As you can see, the neural network instantiated by this </a:t>
+            </a:r>
+            <a:r>
+              <a:rPr lang="en-GB" dirty="0" smtClean="0">
+                <a:sym typeface="Wingdings" panose="05000000000000000000" pitchFamily="2" charset="2"/>
+              </a:rPr>
+              <a:t>(currently) will </a:t>
+            </a:r>
+            <a:r>
+              <a:rPr lang="en-GB" dirty="0" smtClean="0">
+                <a:sym typeface="Wingdings" panose="05000000000000000000" pitchFamily="2" charset="2"/>
+              </a:rPr>
+              <a:t>not be multi-dimensional. I’ll cross that bridge when I come to it</a:t>
             </a:r>
           </a:p>
         </p:txBody>
@@ -3341,6 +3384,1041 @@
     <p:extLst>
       <p:ext uri="{BB962C8B-B14F-4D97-AF65-F5344CB8AC3E}">
         <p14:creationId xmlns:p14="http://schemas.microsoft.com/office/powerpoint/2010/main" val="636811578"/>
+      </p:ext>
+    </p:extLst>
+  </p:cSld>
+  <p:clrMapOvr>
+    <a:masterClrMapping/>
+  </p:clrMapOvr>
+  <p:timing>
+    <p:tnLst>
+      <p:par>
+        <p:cTn id="1" dur="indefinite" restart="never" nodeType="tmRoot"/>
+      </p:par>
+    </p:tnLst>
+  </p:timing>
+</p:sld>
+</file>
+
+<file path=ppt/slides/slide12.xml><?xml version="1.0" encoding="utf-8"?>
+<p:sld xmlns:a="http://schemas.openxmlformats.org/drawingml/2006/main" xmlns:r="http://schemas.openxmlformats.org/officeDocument/2006/relationships" xmlns:p="http://schemas.openxmlformats.org/presentationml/2006/main">
+  <p:cSld>
+    <p:spTree>
+      <p:nvGrpSpPr>
+        <p:cNvPr id="1" name=""/>
+        <p:cNvGrpSpPr/>
+        <p:nvPr/>
+      </p:nvGrpSpPr>
+      <p:grpSpPr>
+        <a:xfrm>
+          <a:off x="0" y="0"/>
+          <a:ext cx="0" cy="0"/>
+          <a:chOff x="0" y="0"/>
+          <a:chExt cx="0" cy="0"/>
+        </a:xfrm>
+      </p:grpSpPr>
+      <p:sp>
+        <p:nvSpPr>
+          <p:cNvPr id="16" name="Text Placeholder 15"/>
+          <p:cNvSpPr>
+            <a:spLocks noGrp="1"/>
+          </p:cNvSpPr>
+          <p:nvPr>
+            <p:ph type="body" idx="1"/>
+          </p:nvPr>
+        </p:nvSpPr>
+        <p:spPr>
+          <a:xfrm>
+            <a:off x="831850" y="5149640"/>
+            <a:ext cx="10515600" cy="1500187"/>
+          </a:xfrm>
+        </p:spPr>
+        <p:txBody>
+          <a:bodyPr>
+            <a:normAutofit fontScale="92500" lnSpcReduction="20000"/>
+          </a:bodyPr>
+          <a:lstStyle/>
+          <a:p>
+            <a:r>
+              <a:rPr lang="en-GB" dirty="0" smtClean="0">
+                <a:sym typeface="Wingdings" panose="05000000000000000000" pitchFamily="2" charset="2"/>
+              </a:rPr>
+              <a:t>As I mentioned previously, we will be making use of supervised learning in this project. In other words, when the neural network is undergoing its learning epoch, it will need to be given the inputs and the correct outputs for those inputs. It would be a lot more manageable if we stored this data in an object and thus I have defined this training data class which will store that information. As you can see, the Outputs and Inputs can only be set by the </a:t>
+            </a:r>
+            <a:r>
+              <a:rPr lang="en-GB" dirty="0" err="1" smtClean="0">
+                <a:sym typeface="Wingdings" panose="05000000000000000000" pitchFamily="2" charset="2"/>
+              </a:rPr>
+              <a:t>TrainingData</a:t>
+            </a:r>
+            <a:r>
+              <a:rPr lang="en-GB" dirty="0" smtClean="0">
+                <a:sym typeface="Wingdings" panose="05000000000000000000" pitchFamily="2" charset="2"/>
+              </a:rPr>
+              <a:t>() construct during instantiation.</a:t>
+            </a:r>
+            <a:endParaRPr lang="en-GB" dirty="0" smtClean="0">
+              <a:sym typeface="Wingdings" panose="05000000000000000000" pitchFamily="2" charset="2"/>
+            </a:endParaRPr>
+          </a:p>
+        </p:txBody>
+      </p:sp>
+      <p:pic>
+        <p:nvPicPr>
+          <p:cNvPr id="12" name="Content Placeholder 11"/>
+          <p:cNvPicPr>
+            <a:picLocks noGrp="1" noChangeAspect="1"/>
+          </p:cNvPicPr>
+          <p:nvPr>
+            <p:ph idx="4294967295"/>
+          </p:nvPr>
+        </p:nvPicPr>
+        <p:blipFill>
+          <a:blip r:embed="rId2"/>
+          <a:stretch>
+            <a:fillRect/>
+          </a:stretch>
+        </p:blipFill>
+        <p:spPr>
+          <a:xfrm>
+            <a:off x="1885165" y="337753"/>
+            <a:ext cx="8408970" cy="4589463"/>
+          </a:xfrm>
+          <a:prstGeom prst="rect">
+            <a:avLst/>
+          </a:prstGeom>
+        </p:spPr>
+      </p:pic>
+      <p:pic>
+        <p:nvPicPr>
+          <p:cNvPr id="3" name="Picture 2"/>
+          <p:cNvPicPr>
+            <a:picLocks noChangeAspect="1"/>
+          </p:cNvPicPr>
+          <p:nvPr/>
+        </p:nvPicPr>
+        <p:blipFill>
+          <a:blip r:embed="rId3"/>
+          <a:stretch>
+            <a:fillRect/>
+          </a:stretch>
+        </p:blipFill>
+        <p:spPr>
+          <a:xfrm>
+            <a:off x="1885165" y="337753"/>
+            <a:ext cx="8408970" cy="4589896"/>
+          </a:xfrm>
+          <a:prstGeom prst="rect">
+            <a:avLst/>
+          </a:prstGeom>
+        </p:spPr>
+      </p:pic>
+    </p:spTree>
+    <p:extLst>
+      <p:ext uri="{BB962C8B-B14F-4D97-AF65-F5344CB8AC3E}">
+        <p14:creationId xmlns:p14="http://schemas.microsoft.com/office/powerpoint/2010/main" val="3644363690"/>
+      </p:ext>
+    </p:extLst>
+  </p:cSld>
+  <p:clrMapOvr>
+    <a:masterClrMapping/>
+  </p:clrMapOvr>
+  <p:timing>
+    <p:tnLst>
+      <p:par>
+        <p:cTn id="1" dur="indefinite" restart="never" nodeType="tmRoot"/>
+      </p:par>
+    </p:tnLst>
+  </p:timing>
+</p:sld>
+</file>
+
+<file path=ppt/slides/slide13.xml><?xml version="1.0" encoding="utf-8"?>
+<p:sld xmlns:a="http://schemas.openxmlformats.org/drawingml/2006/main" xmlns:r="http://schemas.openxmlformats.org/officeDocument/2006/relationships" xmlns:p="http://schemas.openxmlformats.org/presentationml/2006/main">
+  <p:cSld>
+    <p:spTree>
+      <p:nvGrpSpPr>
+        <p:cNvPr id="1" name=""/>
+        <p:cNvGrpSpPr/>
+        <p:nvPr/>
+      </p:nvGrpSpPr>
+      <p:grpSpPr>
+        <a:xfrm>
+          <a:off x="0" y="0"/>
+          <a:ext cx="0" cy="0"/>
+          <a:chOff x="0" y="0"/>
+          <a:chExt cx="0" cy="0"/>
+        </a:xfrm>
+      </p:grpSpPr>
+      <p:sp>
+        <p:nvSpPr>
+          <p:cNvPr id="16" name="Text Placeholder 15"/>
+          <p:cNvSpPr>
+            <a:spLocks noGrp="1"/>
+          </p:cNvSpPr>
+          <p:nvPr>
+            <p:ph type="body" idx="1"/>
+          </p:nvPr>
+        </p:nvSpPr>
+        <p:spPr>
+          <a:xfrm>
+            <a:off x="831850" y="5149640"/>
+            <a:ext cx="10515600" cy="1500187"/>
+          </a:xfrm>
+        </p:spPr>
+        <p:txBody>
+          <a:bodyPr>
+            <a:normAutofit/>
+          </a:bodyPr>
+          <a:lstStyle/>
+          <a:p>
+            <a:r>
+              <a:rPr lang="en-GB" dirty="0" smtClean="0">
+                <a:sym typeface="Wingdings" panose="05000000000000000000" pitchFamily="2" charset="2"/>
+              </a:rPr>
+              <a:t>We can now add this method to our Neural Network interface. I will most likely later make a “</a:t>
+            </a:r>
+            <a:r>
+              <a:rPr lang="en-GB" dirty="0" err="1" smtClean="0">
+                <a:sym typeface="Wingdings" panose="05000000000000000000" pitchFamily="2" charset="2"/>
+              </a:rPr>
+              <a:t>NetworkHelper</a:t>
+            </a:r>
+            <a:r>
+              <a:rPr lang="en-GB" dirty="0" smtClean="0">
+                <a:sym typeface="Wingdings" panose="05000000000000000000" pitchFamily="2" charset="2"/>
+              </a:rPr>
+              <a:t>” later which will standardise the input data and so train the neural network more efficiently. Also, seeing as I am planning to be working with images. This seems like a good idea.</a:t>
+            </a:r>
+            <a:endParaRPr lang="en-GB" dirty="0" smtClean="0">
+              <a:sym typeface="Wingdings" panose="05000000000000000000" pitchFamily="2" charset="2"/>
+            </a:endParaRPr>
+          </a:p>
+        </p:txBody>
+      </p:sp>
+      <p:pic>
+        <p:nvPicPr>
+          <p:cNvPr id="12" name="Content Placeholder 11"/>
+          <p:cNvPicPr>
+            <a:picLocks noGrp="1" noChangeAspect="1"/>
+          </p:cNvPicPr>
+          <p:nvPr>
+            <p:ph idx="4294967295"/>
+          </p:nvPr>
+        </p:nvPicPr>
+        <p:blipFill>
+          <a:blip r:embed="rId2"/>
+          <a:stretch>
+            <a:fillRect/>
+          </a:stretch>
+        </p:blipFill>
+        <p:spPr>
+          <a:xfrm>
+            <a:off x="1885165" y="337753"/>
+            <a:ext cx="8408970" cy="4589463"/>
+          </a:xfrm>
+          <a:prstGeom prst="rect">
+            <a:avLst/>
+          </a:prstGeom>
+        </p:spPr>
+      </p:pic>
+      <p:pic>
+        <p:nvPicPr>
+          <p:cNvPr id="3" name="Picture 2"/>
+          <p:cNvPicPr>
+            <a:picLocks noChangeAspect="1"/>
+          </p:cNvPicPr>
+          <p:nvPr/>
+        </p:nvPicPr>
+        <p:blipFill>
+          <a:blip r:embed="rId3"/>
+          <a:stretch>
+            <a:fillRect/>
+          </a:stretch>
+        </p:blipFill>
+        <p:spPr>
+          <a:xfrm>
+            <a:off x="1885165" y="337753"/>
+            <a:ext cx="8408970" cy="4589896"/>
+          </a:xfrm>
+          <a:prstGeom prst="rect">
+            <a:avLst/>
+          </a:prstGeom>
+        </p:spPr>
+      </p:pic>
+      <p:pic>
+        <p:nvPicPr>
+          <p:cNvPr id="2" name="Picture 1"/>
+          <p:cNvPicPr>
+            <a:picLocks noChangeAspect="1"/>
+          </p:cNvPicPr>
+          <p:nvPr/>
+        </p:nvPicPr>
+        <p:blipFill>
+          <a:blip r:embed="rId4"/>
+          <a:stretch>
+            <a:fillRect/>
+          </a:stretch>
+        </p:blipFill>
+        <p:spPr>
+          <a:xfrm>
+            <a:off x="1885165" y="337753"/>
+            <a:ext cx="8408176" cy="4589463"/>
+          </a:xfrm>
+          <a:prstGeom prst="rect">
+            <a:avLst/>
+          </a:prstGeom>
+        </p:spPr>
+      </p:pic>
+    </p:spTree>
+    <p:extLst>
+      <p:ext uri="{BB962C8B-B14F-4D97-AF65-F5344CB8AC3E}">
+        <p14:creationId xmlns:p14="http://schemas.microsoft.com/office/powerpoint/2010/main" val="923439134"/>
+      </p:ext>
+    </p:extLst>
+  </p:cSld>
+  <p:clrMapOvr>
+    <a:masterClrMapping/>
+  </p:clrMapOvr>
+  <p:timing>
+    <p:tnLst>
+      <p:par>
+        <p:cTn id="1" dur="indefinite" restart="never" nodeType="tmRoot"/>
+      </p:par>
+    </p:tnLst>
+  </p:timing>
+</p:sld>
+</file>
+
+<file path=ppt/slides/slide14.xml><?xml version="1.0" encoding="utf-8"?>
+<p:sld xmlns:a="http://schemas.openxmlformats.org/drawingml/2006/main" xmlns:r="http://schemas.openxmlformats.org/officeDocument/2006/relationships" xmlns:p="http://schemas.openxmlformats.org/presentationml/2006/main">
+  <p:cSld>
+    <p:spTree>
+      <p:nvGrpSpPr>
+        <p:cNvPr id="1" name=""/>
+        <p:cNvGrpSpPr/>
+        <p:nvPr/>
+      </p:nvGrpSpPr>
+      <p:grpSpPr>
+        <a:xfrm>
+          <a:off x="0" y="0"/>
+          <a:ext cx="0" cy="0"/>
+          <a:chOff x="0" y="0"/>
+          <a:chExt cx="0" cy="0"/>
+        </a:xfrm>
+      </p:grpSpPr>
+      <p:sp>
+        <p:nvSpPr>
+          <p:cNvPr id="4" name="Title 3"/>
+          <p:cNvSpPr>
+            <a:spLocks noGrp="1"/>
+          </p:cNvSpPr>
+          <p:nvPr>
+            <p:ph type="title"/>
+          </p:nvPr>
+        </p:nvSpPr>
+        <p:spPr/>
+        <p:txBody>
+          <a:bodyPr/>
+          <a:lstStyle/>
+          <a:p>
+            <a:r>
+              <a:rPr lang="en-GB" dirty="0" smtClean="0"/>
+              <a:t>Do not underestimate input standardisation</a:t>
+            </a:r>
+            <a:endParaRPr lang="en-GB" dirty="0"/>
+          </a:p>
+        </p:txBody>
+      </p:sp>
+      <p:sp>
+        <p:nvSpPr>
+          <p:cNvPr id="5" name="Content Placeholder 4"/>
+          <p:cNvSpPr>
+            <a:spLocks noGrp="1"/>
+          </p:cNvSpPr>
+          <p:nvPr>
+            <p:ph idx="1"/>
+          </p:nvPr>
+        </p:nvSpPr>
+        <p:spPr/>
+        <p:txBody>
+          <a:bodyPr/>
+          <a:lstStyle/>
+          <a:p>
+            <a:pPr marL="0" indent="0">
+              <a:buNone/>
+            </a:pPr>
+            <a:r>
+              <a:rPr lang="en-GB" dirty="0" smtClean="0"/>
+              <a:t>Neural networks are trained a lot faster if their inputs are normalised. If the inputs given to the neural network are combined linearly, in theory, the data set does not need to be standardised because any rescaling of an input vector can effectively be undone by changing the corresponding weights and biases, leaving you with the exact same outputs as you had before. However, standardising inputs can reduce the chances of getting stuck in local optima (also, weight decay and Bayesian estimation can be done more conveniently with standardised inputs). It won’t really hurt to standardise the input data and its largely agreed that input data should be standardised so why not?</a:t>
+            </a:r>
+            <a:endParaRPr lang="en-GB" dirty="0"/>
+          </a:p>
+        </p:txBody>
+      </p:sp>
+    </p:spTree>
+    <p:extLst>
+      <p:ext uri="{BB962C8B-B14F-4D97-AF65-F5344CB8AC3E}">
+        <p14:creationId xmlns:p14="http://schemas.microsoft.com/office/powerpoint/2010/main" val="3368464054"/>
+      </p:ext>
+    </p:extLst>
+  </p:cSld>
+  <p:clrMapOvr>
+    <a:masterClrMapping/>
+  </p:clrMapOvr>
+  <p:timing>
+    <p:tnLst>
+      <p:par>
+        <p:cTn id="1" dur="indefinite" restart="never" nodeType="tmRoot"/>
+      </p:par>
+    </p:tnLst>
+  </p:timing>
+</p:sld>
+</file>
+
+<file path=ppt/slides/slide15.xml><?xml version="1.0" encoding="utf-8"?>
+<p:sld xmlns:a="http://schemas.openxmlformats.org/drawingml/2006/main" xmlns:r="http://schemas.openxmlformats.org/officeDocument/2006/relationships" xmlns:p="http://schemas.openxmlformats.org/presentationml/2006/main">
+  <p:cSld>
+    <p:spTree>
+      <p:nvGrpSpPr>
+        <p:cNvPr id="1" name=""/>
+        <p:cNvGrpSpPr/>
+        <p:nvPr/>
+      </p:nvGrpSpPr>
+      <p:grpSpPr>
+        <a:xfrm>
+          <a:off x="0" y="0"/>
+          <a:ext cx="0" cy="0"/>
+          <a:chOff x="0" y="0"/>
+          <a:chExt cx="0" cy="0"/>
+        </a:xfrm>
+      </p:grpSpPr>
+      <p:sp>
+        <p:nvSpPr>
+          <p:cNvPr id="2" name="Title 1"/>
+          <p:cNvSpPr>
+            <a:spLocks noGrp="1"/>
+          </p:cNvSpPr>
+          <p:nvPr>
+            <p:ph type="title"/>
+          </p:nvPr>
+        </p:nvSpPr>
+        <p:spPr/>
+        <p:txBody>
+          <a:bodyPr/>
+          <a:lstStyle/>
+          <a:p>
+            <a:r>
+              <a:rPr lang="en-GB" dirty="0" smtClean="0"/>
+              <a:t>Implementing the mathematics</a:t>
+            </a:r>
+            <a:endParaRPr lang="en-GB" dirty="0"/>
+          </a:p>
+        </p:txBody>
+      </p:sp>
+      <p:sp>
+        <p:nvSpPr>
+          <p:cNvPr id="3" name="Content Placeholder 2"/>
+          <p:cNvSpPr>
+            <a:spLocks noGrp="1"/>
+          </p:cNvSpPr>
+          <p:nvPr>
+            <p:ph idx="1"/>
+          </p:nvPr>
+        </p:nvSpPr>
+        <p:spPr/>
+        <p:txBody>
+          <a:bodyPr/>
+          <a:lstStyle/>
+          <a:p>
+            <a:pPr marL="0" indent="0">
+              <a:buNone/>
+            </a:pPr>
+            <a:r>
+              <a:rPr lang="en-GB" dirty="0" smtClean="0"/>
+              <a:t>Right, so now that the basic structure of our library has been pretty much fully defined, let’s start working on actually making some classes which implement these interfaces – the classes with which I shall work in order to achieve the aim of this project. Although, like I mentioned before, with this rather generic structure, any number of different neural network systems can be implemented, I shall only be implementing a basic back propagation system. Next, I shall implement the algorithms for calculating the bias and delta of our neuron (which I left empty earlier). The next few slides shall show my progress.</a:t>
+            </a:r>
+            <a:endParaRPr lang="en-GB" dirty="0"/>
+          </a:p>
+        </p:txBody>
+      </p:sp>
+    </p:spTree>
+    <p:extLst>
+      <p:ext uri="{BB962C8B-B14F-4D97-AF65-F5344CB8AC3E}">
+        <p14:creationId xmlns:p14="http://schemas.microsoft.com/office/powerpoint/2010/main" val="3711586033"/>
+      </p:ext>
+    </p:extLst>
+  </p:cSld>
+  <p:clrMapOvr>
+    <a:masterClrMapping/>
+  </p:clrMapOvr>
+  <p:timing>
+    <p:tnLst>
+      <p:par>
+        <p:cTn id="1" dur="indefinite" restart="never" nodeType="tmRoot"/>
+      </p:par>
+    </p:tnLst>
+  </p:timing>
+</p:sld>
+</file>
+
+<file path=ppt/slides/slide16.xml><?xml version="1.0" encoding="utf-8"?>
+<p:sld xmlns:a="http://schemas.openxmlformats.org/drawingml/2006/main" xmlns:r="http://schemas.openxmlformats.org/officeDocument/2006/relationships" xmlns:p="http://schemas.openxmlformats.org/presentationml/2006/main">
+  <p:cSld>
+    <p:spTree>
+      <p:nvGrpSpPr>
+        <p:cNvPr id="1" name=""/>
+        <p:cNvGrpSpPr/>
+        <p:nvPr/>
+      </p:nvGrpSpPr>
+      <p:grpSpPr>
+        <a:xfrm>
+          <a:off x="0" y="0"/>
+          <a:ext cx="0" cy="0"/>
+          <a:chOff x="0" y="0"/>
+          <a:chExt cx="0" cy="0"/>
+        </a:xfrm>
+      </p:grpSpPr>
+      <p:sp>
+        <p:nvSpPr>
+          <p:cNvPr id="2" name="Title 1"/>
+          <p:cNvSpPr>
+            <a:spLocks noGrp="1"/>
+          </p:cNvSpPr>
+          <p:nvPr>
+            <p:ph type="title"/>
+          </p:nvPr>
+        </p:nvSpPr>
+        <p:spPr>
+          <a:xfrm>
+            <a:off x="5097163" y="233320"/>
+            <a:ext cx="6194419" cy="1325563"/>
+          </a:xfrm>
+        </p:spPr>
+        <p:txBody>
+          <a:bodyPr>
+            <a:normAutofit/>
+          </a:bodyPr>
+          <a:lstStyle/>
+          <a:p>
+            <a:r>
+              <a:rPr lang="en-GB" sz="1200" dirty="0" smtClean="0">
+                <a:latin typeface="+mn-lt"/>
+              </a:rPr>
+              <a:t>NB: defining a variable as null, in my opinion, is far better than not defining it at all</a:t>
+            </a:r>
+            <a:endParaRPr lang="en-GB" sz="1200" dirty="0">
+              <a:latin typeface="+mn-lt"/>
+            </a:endParaRPr>
+          </a:p>
+        </p:txBody>
+      </p:sp>
+      <p:pic>
+        <p:nvPicPr>
+          <p:cNvPr id="5" name="Content Placeholder 4"/>
+          <p:cNvPicPr>
+            <a:picLocks noGrp="1" noChangeAspect="1"/>
+          </p:cNvPicPr>
+          <p:nvPr>
+            <p:ph idx="1"/>
+          </p:nvPr>
+        </p:nvPicPr>
+        <p:blipFill>
+          <a:blip r:embed="rId2"/>
+          <a:stretch>
+            <a:fillRect/>
+          </a:stretch>
+        </p:blipFill>
+        <p:spPr>
+          <a:xfrm>
+            <a:off x="2110042" y="1825625"/>
+            <a:ext cx="7971916" cy="4351338"/>
+          </a:xfrm>
+          <a:prstGeom prst="rect">
+            <a:avLst/>
+          </a:prstGeom>
+        </p:spPr>
+      </p:pic>
+      <p:cxnSp>
+        <p:nvCxnSpPr>
+          <p:cNvPr id="7" name="Straight Arrow Connector 6"/>
+          <p:cNvCxnSpPr/>
+          <p:nvPr/>
+        </p:nvCxnSpPr>
+        <p:spPr>
+          <a:xfrm flipH="1">
+            <a:off x="4769709" y="1040235"/>
+            <a:ext cx="3258555" cy="2584414"/>
+          </a:xfrm>
+          <a:prstGeom prst="straightConnector1">
+            <a:avLst/>
+          </a:prstGeom>
+          <a:ln>
+            <a:tailEnd type="triangle"/>
+          </a:ln>
+        </p:spPr>
+        <p:style>
+          <a:lnRef idx="1">
+            <a:schemeClr val="accent1"/>
+          </a:lnRef>
+          <a:fillRef idx="0">
+            <a:schemeClr val="accent1"/>
+          </a:fillRef>
+          <a:effectRef idx="0">
+            <a:schemeClr val="accent1"/>
+          </a:effectRef>
+          <a:fontRef idx="minor">
+            <a:schemeClr val="tx1"/>
+          </a:fontRef>
+        </p:style>
+      </p:cxnSp>
+    </p:spTree>
+    <p:extLst>
+      <p:ext uri="{BB962C8B-B14F-4D97-AF65-F5344CB8AC3E}">
+        <p14:creationId xmlns:p14="http://schemas.microsoft.com/office/powerpoint/2010/main" val="1857537733"/>
+      </p:ext>
+    </p:extLst>
+  </p:cSld>
+  <p:clrMapOvr>
+    <a:masterClrMapping/>
+  </p:clrMapOvr>
+  <p:timing>
+    <p:tnLst>
+      <p:par>
+        <p:cTn id="1" dur="indefinite" restart="never" nodeType="tmRoot"/>
+      </p:par>
+    </p:tnLst>
+  </p:timing>
+</p:sld>
+</file>
+
+<file path=ppt/slides/slide17.xml><?xml version="1.0" encoding="utf-8"?>
+<p:sld xmlns:a="http://schemas.openxmlformats.org/drawingml/2006/main" xmlns:r="http://schemas.openxmlformats.org/officeDocument/2006/relationships" xmlns:p="http://schemas.openxmlformats.org/presentationml/2006/main">
+  <p:cSld>
+    <p:spTree>
+      <p:nvGrpSpPr>
+        <p:cNvPr id="1" name=""/>
+        <p:cNvGrpSpPr/>
+        <p:nvPr/>
+      </p:nvGrpSpPr>
+      <p:grpSpPr>
+        <a:xfrm>
+          <a:off x="0" y="0"/>
+          <a:ext cx="0" cy="0"/>
+          <a:chOff x="0" y="0"/>
+          <a:chExt cx="0" cy="0"/>
+        </a:xfrm>
+      </p:grpSpPr>
+      <p:sp>
+        <p:nvSpPr>
+          <p:cNvPr id="2" name="Title 1"/>
+          <p:cNvSpPr>
+            <a:spLocks noGrp="1"/>
+          </p:cNvSpPr>
+          <p:nvPr>
+            <p:ph type="title"/>
+          </p:nvPr>
+        </p:nvSpPr>
+        <p:spPr/>
+        <p:txBody>
+          <a:bodyPr>
+            <a:normAutofit/>
+          </a:bodyPr>
+          <a:lstStyle/>
+          <a:p>
+            <a:r>
+              <a:rPr lang="en-GB" sz="1200" dirty="0" smtClean="0">
+                <a:latin typeface="+mn-lt"/>
+              </a:rPr>
+              <a:t>All these properties definitions everywhere do look slightly ugly, but it can’t be helped – there is no other way of doing it. I need to be able to access them through the interface and interfaces can’t implement fields. Of course, I could have just taken the easy (and very lazy) way out and not made the interfaces and instead just define the objects and I probably would have gotten away with it since I only need this type of setup for this project, but I want this library to be a little more useful than something as plain as that. Well, the good thing is, I can (and have), if I want to disallow variables being changed in the object from outside of the scope of the class by simply not defining a “set”</a:t>
+            </a:r>
+            <a:endParaRPr lang="en-GB" sz="1200" dirty="0">
+              <a:latin typeface="+mn-lt"/>
+            </a:endParaRPr>
+          </a:p>
+        </p:txBody>
+      </p:sp>
+      <p:pic>
+        <p:nvPicPr>
+          <p:cNvPr id="5" name="Content Placeholder 4"/>
+          <p:cNvPicPr>
+            <a:picLocks noGrp="1" noChangeAspect="1"/>
+          </p:cNvPicPr>
+          <p:nvPr>
+            <p:ph idx="1"/>
+          </p:nvPr>
+        </p:nvPicPr>
+        <p:blipFill>
+          <a:blip r:embed="rId2"/>
+          <a:stretch>
+            <a:fillRect/>
+          </a:stretch>
+        </p:blipFill>
+        <p:spPr>
+          <a:xfrm>
+            <a:off x="2110042" y="1825625"/>
+            <a:ext cx="7971916" cy="4351338"/>
+          </a:xfrm>
+          <a:prstGeom prst="rect">
+            <a:avLst/>
+          </a:prstGeom>
+        </p:spPr>
+      </p:pic>
+      <p:pic>
+        <p:nvPicPr>
+          <p:cNvPr id="12" name="Picture 11"/>
+          <p:cNvPicPr>
+            <a:picLocks noChangeAspect="1"/>
+          </p:cNvPicPr>
+          <p:nvPr/>
+        </p:nvPicPr>
+        <p:blipFill>
+          <a:blip r:embed="rId3"/>
+          <a:stretch>
+            <a:fillRect/>
+          </a:stretch>
+        </p:blipFill>
+        <p:spPr>
+          <a:xfrm>
+            <a:off x="2110042" y="1820117"/>
+            <a:ext cx="7982008" cy="4356846"/>
+          </a:xfrm>
+          <a:prstGeom prst="rect">
+            <a:avLst/>
+          </a:prstGeom>
+        </p:spPr>
+      </p:pic>
+      <p:cxnSp>
+        <p:nvCxnSpPr>
+          <p:cNvPr id="9" name="Straight Arrow Connector 8"/>
+          <p:cNvCxnSpPr/>
+          <p:nvPr/>
+        </p:nvCxnSpPr>
+        <p:spPr>
+          <a:xfrm flipH="1">
+            <a:off x="4333103" y="1268627"/>
+            <a:ext cx="411895" cy="2732667"/>
+          </a:xfrm>
+          <a:prstGeom prst="straightConnector1">
+            <a:avLst/>
+          </a:prstGeom>
+          <a:ln>
+            <a:tailEnd type="triangle"/>
+          </a:ln>
+        </p:spPr>
+        <p:style>
+          <a:lnRef idx="1">
+            <a:schemeClr val="accent1"/>
+          </a:lnRef>
+          <a:fillRef idx="0">
+            <a:schemeClr val="accent1"/>
+          </a:fillRef>
+          <a:effectRef idx="0">
+            <a:schemeClr val="accent1"/>
+          </a:effectRef>
+          <a:fontRef idx="minor">
+            <a:schemeClr val="tx1"/>
+          </a:fontRef>
+        </p:style>
+      </p:cxnSp>
+      <p:cxnSp>
+        <p:nvCxnSpPr>
+          <p:cNvPr id="7" name="Straight Arrow Connector 6"/>
+          <p:cNvCxnSpPr/>
+          <p:nvPr/>
+        </p:nvCxnSpPr>
+        <p:spPr>
+          <a:xfrm flipH="1">
+            <a:off x="4637903" y="1268627"/>
+            <a:ext cx="107093" cy="2281881"/>
+          </a:xfrm>
+          <a:prstGeom prst="straightConnector1">
+            <a:avLst/>
+          </a:prstGeom>
+          <a:ln>
+            <a:tailEnd type="triangle"/>
+          </a:ln>
+        </p:spPr>
+        <p:style>
+          <a:lnRef idx="1">
+            <a:schemeClr val="accent1"/>
+          </a:lnRef>
+          <a:fillRef idx="0">
+            <a:schemeClr val="accent1"/>
+          </a:fillRef>
+          <a:effectRef idx="0">
+            <a:schemeClr val="accent1"/>
+          </a:effectRef>
+          <a:fontRef idx="minor">
+            <a:schemeClr val="tx1"/>
+          </a:fontRef>
+        </p:style>
+      </p:cxnSp>
+    </p:spTree>
+    <p:extLst>
+      <p:ext uri="{BB962C8B-B14F-4D97-AF65-F5344CB8AC3E}">
+        <p14:creationId xmlns:p14="http://schemas.microsoft.com/office/powerpoint/2010/main" val="3122487365"/>
+      </p:ext>
+    </p:extLst>
+  </p:cSld>
+  <p:clrMapOvr>
+    <a:masterClrMapping/>
+  </p:clrMapOvr>
+  <p:timing>
+    <p:tnLst>
+      <p:par>
+        <p:cTn id="1" dur="indefinite" restart="never" nodeType="tmRoot">
+          <p:childTnLst>
+            <p:seq concurrent="1" nextAc="seek">
+              <p:cTn id="2" dur="indefinite" nodeType="mainSeq">
+                <p:childTnLst>
+                  <p:par>
+                    <p:cTn id="3" fill="hold">
+                      <p:stCondLst>
+                        <p:cond delay="indefinite"/>
+                      </p:stCondLst>
+                      <p:childTnLst>
+                        <p:par>
+                          <p:cTn id="4" fill="hold">
+                            <p:stCondLst>
+                              <p:cond delay="0"/>
+                            </p:stCondLst>
+                            <p:childTnLst>
+                              <p:par>
+                                <p:cTn id="5" presetID="10" presetClass="entr" presetSubtype="0" fill="hold" nodeType="clickEffect">
+                                  <p:stCondLst>
+                                    <p:cond delay="0"/>
+                                  </p:stCondLst>
+                                  <p:childTnLst>
+                                    <p:set>
+                                      <p:cBhvr>
+                                        <p:cTn id="6" dur="1" fill="hold">
+                                          <p:stCondLst>
+                                            <p:cond delay="0"/>
+                                          </p:stCondLst>
+                                        </p:cTn>
+                                        <p:tgtEl>
+                                          <p:spTgt spid="12"/>
+                                        </p:tgtEl>
+                                        <p:attrNameLst>
+                                          <p:attrName>style.visibility</p:attrName>
+                                        </p:attrNameLst>
+                                      </p:cBhvr>
+                                      <p:to>
+                                        <p:strVal val="visible"/>
+                                      </p:to>
+                                    </p:set>
+                                    <p:animEffect transition="in" filter="fade">
+                                      <p:cBhvr>
+                                        <p:cTn id="7" dur="500"/>
+                                        <p:tgtEl>
+                                          <p:spTgt spid="12"/>
+                                        </p:tgtEl>
+                                      </p:cBhvr>
+                                    </p:animEffect>
+                                  </p:childTnLst>
+                                </p:cTn>
+                              </p:par>
+                            </p:childTnLst>
+                          </p:cTn>
+                        </p:par>
+                      </p:childTnLst>
+                    </p:cTn>
+                  </p:par>
+                </p:childTnLst>
+              </p:cTn>
+              <p:prevCondLst>
+                <p:cond evt="onPrev" delay="0">
+                  <p:tgtEl>
+                    <p:sldTgt/>
+                  </p:tgtEl>
+                </p:cond>
+              </p:prevCondLst>
+              <p:nextCondLst>
+                <p:cond evt="onNext" delay="0">
+                  <p:tgtEl>
+                    <p:sldTgt/>
+                  </p:tgtEl>
+                </p:cond>
+              </p:nextCondLst>
+            </p:seq>
+          </p:childTnLst>
+        </p:cTn>
+      </p:par>
+    </p:tnLst>
+  </p:timing>
+</p:sld>
+</file>
+
+<file path=ppt/slides/slide18.xml><?xml version="1.0" encoding="utf-8"?>
+<p:sld xmlns:a="http://schemas.openxmlformats.org/drawingml/2006/main" xmlns:r="http://schemas.openxmlformats.org/officeDocument/2006/relationships" xmlns:p="http://schemas.openxmlformats.org/presentationml/2006/main">
+  <p:cSld>
+    <p:spTree>
+      <p:nvGrpSpPr>
+        <p:cNvPr id="1" name=""/>
+        <p:cNvGrpSpPr/>
+        <p:nvPr/>
+      </p:nvGrpSpPr>
+      <p:grpSpPr>
+        <a:xfrm>
+          <a:off x="0" y="0"/>
+          <a:ext cx="0" cy="0"/>
+          <a:chOff x="0" y="0"/>
+          <a:chExt cx="0" cy="0"/>
+        </a:xfrm>
+      </p:grpSpPr>
+      <p:sp>
+        <p:nvSpPr>
+          <p:cNvPr id="2" name="Title 1"/>
+          <p:cNvSpPr>
+            <a:spLocks noGrp="1"/>
+          </p:cNvSpPr>
+          <p:nvPr>
+            <p:ph type="title"/>
+          </p:nvPr>
+        </p:nvSpPr>
+        <p:spPr/>
+        <p:txBody>
+          <a:bodyPr>
+            <a:normAutofit/>
+          </a:bodyPr>
+          <a:lstStyle/>
+          <a:p>
+            <a:r>
+              <a:rPr lang="en-GB" sz="1800" dirty="0" smtClean="0">
+                <a:latin typeface="+mn-lt"/>
+              </a:rPr>
+              <a:t>As you can see, the calculations will be done in the strategy (as I mentioned previously).</a:t>
+            </a:r>
+            <a:endParaRPr lang="en-GB" sz="1800" dirty="0">
+              <a:latin typeface="+mn-lt"/>
+            </a:endParaRPr>
+          </a:p>
+        </p:txBody>
+      </p:sp>
+      <p:pic>
+        <p:nvPicPr>
+          <p:cNvPr id="4" name="Content Placeholder 3"/>
+          <p:cNvPicPr>
+            <a:picLocks noGrp="1" noChangeAspect="1"/>
+          </p:cNvPicPr>
+          <p:nvPr>
+            <p:ph idx="1"/>
+          </p:nvPr>
+        </p:nvPicPr>
+        <p:blipFill>
+          <a:blip r:embed="rId2"/>
+          <a:stretch>
+            <a:fillRect/>
+          </a:stretch>
+        </p:blipFill>
+        <p:spPr>
+          <a:xfrm>
+            <a:off x="2110042" y="1825625"/>
+            <a:ext cx="7971916" cy="4351338"/>
+          </a:xfrm>
+          <a:prstGeom prst="rect">
+            <a:avLst/>
+          </a:prstGeom>
+        </p:spPr>
+      </p:pic>
+    </p:spTree>
+    <p:extLst>
+      <p:ext uri="{BB962C8B-B14F-4D97-AF65-F5344CB8AC3E}">
+        <p14:creationId xmlns:p14="http://schemas.microsoft.com/office/powerpoint/2010/main" val="3104413077"/>
+      </p:ext>
+    </p:extLst>
+  </p:cSld>
+  <p:clrMapOvr>
+    <a:masterClrMapping/>
+  </p:clrMapOvr>
+  <p:timing>
+    <p:tnLst>
+      <p:par>
+        <p:cTn id="1" dur="indefinite" restart="never" nodeType="tmRoot"/>
+      </p:par>
+    </p:tnLst>
+  </p:timing>
+</p:sld>
+</file>
+
+<file path=ppt/slides/slide19.xml><?xml version="1.0" encoding="utf-8"?>
+<p:sld xmlns:a="http://schemas.openxmlformats.org/drawingml/2006/main" xmlns:r="http://schemas.openxmlformats.org/officeDocument/2006/relationships" xmlns:p="http://schemas.openxmlformats.org/presentationml/2006/main">
+  <p:cSld>
+    <p:spTree>
+      <p:nvGrpSpPr>
+        <p:cNvPr id="1" name=""/>
+        <p:cNvGrpSpPr/>
+        <p:nvPr/>
+      </p:nvGrpSpPr>
+      <p:grpSpPr>
+        <a:xfrm>
+          <a:off x="0" y="0"/>
+          <a:ext cx="0" cy="0"/>
+          <a:chOff x="0" y="0"/>
+          <a:chExt cx="0" cy="0"/>
+        </a:xfrm>
+      </p:grpSpPr>
+      <p:sp>
+        <p:nvSpPr>
+          <p:cNvPr id="2" name="Title 1"/>
+          <p:cNvSpPr>
+            <a:spLocks noGrp="1"/>
+          </p:cNvSpPr>
+          <p:nvPr>
+            <p:ph type="title"/>
+          </p:nvPr>
+        </p:nvSpPr>
+        <p:spPr/>
+        <p:txBody>
+          <a:bodyPr/>
+          <a:lstStyle/>
+          <a:p>
+            <a:r>
+              <a:rPr lang="en-GB" dirty="0" smtClean="0"/>
+              <a:t>Error Handling</a:t>
+            </a:r>
+            <a:endParaRPr lang="en-GB" dirty="0"/>
+          </a:p>
+        </p:txBody>
+      </p:sp>
+      <p:sp>
+        <p:nvSpPr>
+          <p:cNvPr id="5" name="Text Placeholder 4"/>
+          <p:cNvSpPr>
+            <a:spLocks noGrp="1"/>
+          </p:cNvSpPr>
+          <p:nvPr>
+            <p:ph type="body" idx="1"/>
+          </p:nvPr>
+        </p:nvSpPr>
+        <p:spPr/>
+        <p:txBody>
+          <a:bodyPr>
+            <a:normAutofit fontScale="92500" lnSpcReduction="10000"/>
+          </a:bodyPr>
+          <a:lstStyle/>
+          <a:p>
+            <a:r>
+              <a:rPr lang="en-GB" dirty="0" smtClean="0"/>
+              <a:t>I just realised, if the strategy for the neuron has not yet been initialised, the program will crash here(most likely throw a </a:t>
+            </a:r>
+            <a:r>
+              <a:rPr lang="en-GB" dirty="0" err="1" smtClean="0"/>
+              <a:t>NullReferenceException</a:t>
+            </a:r>
+            <a:r>
+              <a:rPr lang="en-GB" dirty="0" smtClean="0"/>
+              <a:t>) (if you are silly enough to not use a try/catch AND to forget to initialise the strategy in the first place). Oh well, just for completion purposes, I’m going to add a catch and define my an exception. The next few slides shall be about this.</a:t>
+            </a:r>
+            <a:endParaRPr lang="en-GB" dirty="0"/>
+          </a:p>
+        </p:txBody>
+      </p:sp>
+    </p:spTree>
+    <p:extLst>
+      <p:ext uri="{BB962C8B-B14F-4D97-AF65-F5344CB8AC3E}">
+        <p14:creationId xmlns:p14="http://schemas.microsoft.com/office/powerpoint/2010/main" val="1581382388"/>
       </p:ext>
     </p:extLst>
   </p:cSld>
@@ -3427,6 +4505,794 @@
     <p:extLst>
       <p:ext uri="{BB962C8B-B14F-4D97-AF65-F5344CB8AC3E}">
         <p14:creationId xmlns:p14="http://schemas.microsoft.com/office/powerpoint/2010/main" val="798375993"/>
+      </p:ext>
+    </p:extLst>
+  </p:cSld>
+  <p:clrMapOvr>
+    <a:masterClrMapping/>
+  </p:clrMapOvr>
+  <p:timing>
+    <p:tnLst>
+      <p:par>
+        <p:cTn id="1" dur="indefinite" restart="never" nodeType="tmRoot"/>
+      </p:par>
+    </p:tnLst>
+  </p:timing>
+</p:sld>
+</file>
+
+<file path=ppt/slides/slide20.xml><?xml version="1.0" encoding="utf-8"?>
+<p:sld xmlns:a="http://schemas.openxmlformats.org/drawingml/2006/main" xmlns:r="http://schemas.openxmlformats.org/officeDocument/2006/relationships" xmlns:p="http://schemas.openxmlformats.org/presentationml/2006/main">
+  <p:cSld>
+    <p:spTree>
+      <p:nvGrpSpPr>
+        <p:cNvPr id="1" name=""/>
+        <p:cNvGrpSpPr/>
+        <p:nvPr/>
+      </p:nvGrpSpPr>
+      <p:grpSpPr>
+        <a:xfrm>
+          <a:off x="0" y="0"/>
+          <a:ext cx="0" cy="0"/>
+          <a:chOff x="0" y="0"/>
+          <a:chExt cx="0" cy="0"/>
+        </a:xfrm>
+      </p:grpSpPr>
+      <p:sp>
+        <p:nvSpPr>
+          <p:cNvPr id="4" name="Title 3"/>
+          <p:cNvSpPr>
+            <a:spLocks noGrp="1"/>
+          </p:cNvSpPr>
+          <p:nvPr>
+            <p:ph type="title"/>
+          </p:nvPr>
+        </p:nvSpPr>
+        <p:spPr/>
+        <p:txBody>
+          <a:bodyPr>
+            <a:noAutofit/>
+          </a:bodyPr>
+          <a:lstStyle/>
+          <a:p>
+            <a:r>
+              <a:rPr lang="en-GB" sz="1800" dirty="0" smtClean="0">
+                <a:latin typeface="+mn-lt"/>
+              </a:rPr>
+              <a:t>It is good practice to define a base exception and inherit more specific exceptions from it. Here’s me defining the base exception. I shall keep it in the </a:t>
+            </a:r>
+            <a:r>
+              <a:rPr lang="en-GB" sz="1800" dirty="0" err="1" smtClean="0">
+                <a:latin typeface="+mn-lt"/>
+              </a:rPr>
+              <a:t>LibNeuroOCR.Exception</a:t>
+            </a:r>
+            <a:r>
+              <a:rPr lang="en-GB" sz="1800" dirty="0" smtClean="0">
+                <a:latin typeface="+mn-lt"/>
+              </a:rPr>
+              <a:t> namespace to keep it tidy.</a:t>
+            </a:r>
+            <a:endParaRPr lang="en-GB" sz="1800" dirty="0">
+              <a:latin typeface="+mn-lt"/>
+            </a:endParaRPr>
+          </a:p>
+        </p:txBody>
+      </p:sp>
+      <p:pic>
+        <p:nvPicPr>
+          <p:cNvPr id="6" name="Content Placeholder 5"/>
+          <p:cNvPicPr>
+            <a:picLocks noGrp="1" noChangeAspect="1"/>
+          </p:cNvPicPr>
+          <p:nvPr>
+            <p:ph idx="1"/>
+          </p:nvPr>
+        </p:nvPicPr>
+        <p:blipFill>
+          <a:blip r:embed="rId2"/>
+          <a:stretch>
+            <a:fillRect/>
+          </a:stretch>
+        </p:blipFill>
+        <p:spPr>
+          <a:xfrm>
+            <a:off x="2110042" y="1825625"/>
+            <a:ext cx="7971916" cy="4351338"/>
+          </a:xfrm>
+          <a:prstGeom prst="rect">
+            <a:avLst/>
+          </a:prstGeom>
+        </p:spPr>
+      </p:pic>
+      <p:cxnSp>
+        <p:nvCxnSpPr>
+          <p:cNvPr id="8" name="Straight Arrow Connector 7"/>
+          <p:cNvCxnSpPr/>
+          <p:nvPr/>
+        </p:nvCxnSpPr>
+        <p:spPr>
+          <a:xfrm flipV="1">
+            <a:off x="2397211" y="2537254"/>
+            <a:ext cx="1235675" cy="1252151"/>
+          </a:xfrm>
+          <a:prstGeom prst="straightConnector1">
+            <a:avLst/>
+          </a:prstGeom>
+          <a:ln>
+            <a:tailEnd type="triangle"/>
+          </a:ln>
+        </p:spPr>
+        <p:style>
+          <a:lnRef idx="1">
+            <a:schemeClr val="accent1"/>
+          </a:lnRef>
+          <a:fillRef idx="0">
+            <a:schemeClr val="accent1"/>
+          </a:fillRef>
+          <a:effectRef idx="0">
+            <a:schemeClr val="accent1"/>
+          </a:effectRef>
+          <a:fontRef idx="minor">
+            <a:schemeClr val="tx1"/>
+          </a:fontRef>
+        </p:style>
+      </p:cxnSp>
+      <p:sp>
+        <p:nvSpPr>
+          <p:cNvPr id="12" name="TextBox 11"/>
+          <p:cNvSpPr txBox="1"/>
+          <p:nvPr/>
+        </p:nvSpPr>
+        <p:spPr>
+          <a:xfrm>
+            <a:off x="172994" y="3789405"/>
+            <a:ext cx="6153665" cy="1200329"/>
+          </a:xfrm>
+          <a:prstGeom prst="rect">
+            <a:avLst/>
+          </a:prstGeom>
+        </p:spPr>
+        <p:style>
+          <a:lnRef idx="2">
+            <a:schemeClr val="dk1"/>
+          </a:lnRef>
+          <a:fillRef idx="1">
+            <a:schemeClr val="lt1"/>
+          </a:fillRef>
+          <a:effectRef idx="0">
+            <a:schemeClr val="dk1"/>
+          </a:effectRef>
+          <a:fontRef idx="minor">
+            <a:schemeClr val="dk1"/>
+          </a:fontRef>
+        </p:style>
+        <p:txBody>
+          <a:bodyPr wrap="square" rtlCol="0">
+            <a:spAutoFit/>
+          </a:bodyPr>
+          <a:lstStyle/>
+          <a:p>
+            <a:r>
+              <a:rPr lang="en-GB" dirty="0" err="1" smtClean="0"/>
+              <a:t>Ack</a:t>
+            </a:r>
+            <a:r>
+              <a:rPr lang="en-GB" dirty="0" smtClean="0"/>
+              <a:t>, I just realised that naming the namespace “Exception” creates pretty bad ambiguities. I’ll stick with it nonetheless.</a:t>
+            </a:r>
+          </a:p>
+          <a:p>
+            <a:r>
+              <a:rPr lang="en-GB" dirty="0" smtClean="0"/>
+              <a:t>We can solve the ambiguities by doing this. (or just doing “</a:t>
+            </a:r>
+            <a:r>
+              <a:rPr lang="en-GB" dirty="0" err="1" smtClean="0"/>
+              <a:t>System.Exception</a:t>
+            </a:r>
+            <a:r>
+              <a:rPr lang="en-GB" dirty="0" smtClean="0"/>
+              <a:t>” every time we have to use “Exception”)</a:t>
+            </a:r>
+            <a:endParaRPr lang="en-GB" dirty="0"/>
+          </a:p>
+        </p:txBody>
+      </p:sp>
+    </p:spTree>
+    <p:extLst>
+      <p:ext uri="{BB962C8B-B14F-4D97-AF65-F5344CB8AC3E}">
+        <p14:creationId xmlns:p14="http://schemas.microsoft.com/office/powerpoint/2010/main" val="527263262"/>
+      </p:ext>
+    </p:extLst>
+  </p:cSld>
+  <p:clrMapOvr>
+    <a:masterClrMapping/>
+  </p:clrMapOvr>
+  <p:timing>
+    <p:tnLst>
+      <p:par>
+        <p:cTn id="1" dur="indefinite" restart="never" nodeType="tmRoot"/>
+      </p:par>
+    </p:tnLst>
+  </p:timing>
+</p:sld>
+</file>
+
+<file path=ppt/slides/slide21.xml><?xml version="1.0" encoding="utf-8"?>
+<p:sld xmlns:a="http://schemas.openxmlformats.org/drawingml/2006/main" xmlns:r="http://schemas.openxmlformats.org/officeDocument/2006/relationships" xmlns:p="http://schemas.openxmlformats.org/presentationml/2006/main">
+  <p:cSld>
+    <p:spTree>
+      <p:nvGrpSpPr>
+        <p:cNvPr id="1" name=""/>
+        <p:cNvGrpSpPr/>
+        <p:nvPr/>
+      </p:nvGrpSpPr>
+      <p:grpSpPr>
+        <a:xfrm>
+          <a:off x="0" y="0"/>
+          <a:ext cx="0" cy="0"/>
+          <a:chOff x="0" y="0"/>
+          <a:chExt cx="0" cy="0"/>
+        </a:xfrm>
+      </p:grpSpPr>
+      <p:sp>
+        <p:nvSpPr>
+          <p:cNvPr id="4" name="Title 3"/>
+          <p:cNvSpPr>
+            <a:spLocks noGrp="1"/>
+          </p:cNvSpPr>
+          <p:nvPr>
+            <p:ph type="title"/>
+          </p:nvPr>
+        </p:nvSpPr>
+        <p:spPr/>
+        <p:txBody>
+          <a:bodyPr>
+            <a:noAutofit/>
+          </a:bodyPr>
+          <a:lstStyle/>
+          <a:p>
+            <a:r>
+              <a:rPr lang="en-GB" sz="1800" dirty="0" smtClean="0">
+                <a:latin typeface="+mn-lt"/>
+              </a:rPr>
+              <a:t>(I later decided “Ex” looked a bit better than “ex”)…</a:t>
+            </a:r>
+            <a:endParaRPr lang="en-GB" sz="1800" dirty="0">
+              <a:latin typeface="+mn-lt"/>
+            </a:endParaRPr>
+          </a:p>
+        </p:txBody>
+      </p:sp>
+      <p:pic>
+        <p:nvPicPr>
+          <p:cNvPr id="6" name="Content Placeholder 5"/>
+          <p:cNvPicPr>
+            <a:picLocks noGrp="1" noChangeAspect="1"/>
+          </p:cNvPicPr>
+          <p:nvPr>
+            <p:ph idx="1"/>
+          </p:nvPr>
+        </p:nvPicPr>
+        <p:blipFill>
+          <a:blip r:embed="rId2"/>
+          <a:stretch>
+            <a:fillRect/>
+          </a:stretch>
+        </p:blipFill>
+        <p:spPr>
+          <a:xfrm>
+            <a:off x="2110042" y="1825625"/>
+            <a:ext cx="7971916" cy="4351338"/>
+          </a:xfrm>
+          <a:prstGeom prst="rect">
+            <a:avLst/>
+          </a:prstGeom>
+        </p:spPr>
+      </p:pic>
+      <p:pic>
+        <p:nvPicPr>
+          <p:cNvPr id="2" name="Picture 1"/>
+          <p:cNvPicPr>
+            <a:picLocks noChangeAspect="1"/>
+          </p:cNvPicPr>
+          <p:nvPr/>
+        </p:nvPicPr>
+        <p:blipFill>
+          <a:blip r:embed="rId3"/>
+          <a:stretch>
+            <a:fillRect/>
+          </a:stretch>
+        </p:blipFill>
+        <p:spPr>
+          <a:xfrm>
+            <a:off x="2110042" y="1825625"/>
+            <a:ext cx="7971916" cy="4351337"/>
+          </a:xfrm>
+          <a:prstGeom prst="rect">
+            <a:avLst/>
+          </a:prstGeom>
+        </p:spPr>
+      </p:pic>
+    </p:spTree>
+    <p:extLst>
+      <p:ext uri="{BB962C8B-B14F-4D97-AF65-F5344CB8AC3E}">
+        <p14:creationId xmlns:p14="http://schemas.microsoft.com/office/powerpoint/2010/main" val="2759887531"/>
+      </p:ext>
+    </p:extLst>
+  </p:cSld>
+  <p:clrMapOvr>
+    <a:masterClrMapping/>
+  </p:clrMapOvr>
+  <mc:AlternateContent xmlns:mc="http://schemas.openxmlformats.org/markup-compatibility/2006">
+    <mc:Choice xmlns:p14="http://schemas.microsoft.com/office/powerpoint/2010/main" Requires="p14">
+      <p:transition p14:dur="250">
+        <p:fade/>
+      </p:transition>
+    </mc:Choice>
+    <mc:Fallback>
+      <p:transition>
+        <p:fade/>
+      </p:transition>
+    </mc:Fallback>
+  </mc:AlternateContent>
+  <p:timing>
+    <p:tnLst>
+      <p:par>
+        <p:cTn id="1" dur="indefinite" restart="never" nodeType="tmRoot"/>
+      </p:par>
+    </p:tnLst>
+  </p:timing>
+</p:sld>
+</file>
+
+<file path=ppt/slides/slide22.xml><?xml version="1.0" encoding="utf-8"?>
+<p:sld xmlns:a="http://schemas.openxmlformats.org/drawingml/2006/main" xmlns:r="http://schemas.openxmlformats.org/officeDocument/2006/relationships" xmlns:p="http://schemas.openxmlformats.org/presentationml/2006/main">
+  <p:cSld>
+    <p:spTree>
+      <p:nvGrpSpPr>
+        <p:cNvPr id="1" name=""/>
+        <p:cNvGrpSpPr/>
+        <p:nvPr/>
+      </p:nvGrpSpPr>
+      <p:grpSpPr>
+        <a:xfrm>
+          <a:off x="0" y="0"/>
+          <a:ext cx="0" cy="0"/>
+          <a:chOff x="0" y="0"/>
+          <a:chExt cx="0" cy="0"/>
+        </a:xfrm>
+      </p:grpSpPr>
+      <p:sp>
+        <p:nvSpPr>
+          <p:cNvPr id="4" name="Title 3"/>
+          <p:cNvSpPr>
+            <a:spLocks noGrp="1"/>
+          </p:cNvSpPr>
+          <p:nvPr>
+            <p:ph type="title"/>
+          </p:nvPr>
+        </p:nvSpPr>
+        <p:spPr/>
+        <p:txBody>
+          <a:bodyPr>
+            <a:noAutofit/>
+          </a:bodyPr>
+          <a:lstStyle/>
+          <a:p>
+            <a:r>
+              <a:rPr lang="en-GB" sz="1800" dirty="0" smtClean="0">
+                <a:latin typeface="+mn-lt"/>
+              </a:rPr>
+              <a:t>Here’s a </a:t>
+            </a:r>
+            <a:r>
+              <a:rPr lang="en-GB" sz="1800" dirty="0" err="1" smtClean="0">
+                <a:latin typeface="+mn-lt"/>
+              </a:rPr>
+              <a:t>NullStrategyException</a:t>
+            </a:r>
+            <a:r>
+              <a:rPr lang="en-GB" sz="1800" dirty="0" smtClean="0">
+                <a:latin typeface="+mn-lt"/>
+              </a:rPr>
+              <a:t> I made for now. I’ll add more exceptions as I go on if I need to. (Although I guess you could say I didn’t need to do this in the first place – I could have just used something like </a:t>
+            </a:r>
+            <a:r>
+              <a:rPr lang="en-GB" sz="1800" dirty="0" err="1" smtClean="0">
+                <a:latin typeface="+mn-lt"/>
+              </a:rPr>
+              <a:t>InvalidOperationException</a:t>
+            </a:r>
+            <a:r>
+              <a:rPr lang="en-GB" sz="1800" dirty="0" smtClean="0">
+                <a:latin typeface="+mn-lt"/>
+              </a:rPr>
+              <a:t> and handled the exceptions by looking at the messages and throwing, </a:t>
+            </a:r>
+            <a:r>
+              <a:rPr lang="en-GB" sz="1800" dirty="0" err="1" smtClean="0">
+                <a:latin typeface="+mn-lt"/>
+              </a:rPr>
+              <a:t>etc</a:t>
+            </a:r>
+            <a:r>
+              <a:rPr lang="en-GB" sz="1800" dirty="0" smtClean="0">
+                <a:latin typeface="+mn-lt"/>
+              </a:rPr>
+              <a:t>)</a:t>
+            </a:r>
+            <a:endParaRPr lang="en-GB" sz="1800" dirty="0">
+              <a:latin typeface="+mn-lt"/>
+            </a:endParaRPr>
+          </a:p>
+        </p:txBody>
+      </p:sp>
+      <p:pic>
+        <p:nvPicPr>
+          <p:cNvPr id="6" name="Content Placeholder 5"/>
+          <p:cNvPicPr>
+            <a:picLocks noGrp="1" noChangeAspect="1"/>
+          </p:cNvPicPr>
+          <p:nvPr>
+            <p:ph idx="1"/>
+          </p:nvPr>
+        </p:nvPicPr>
+        <p:blipFill>
+          <a:blip r:embed="rId2"/>
+          <a:stretch>
+            <a:fillRect/>
+          </a:stretch>
+        </p:blipFill>
+        <p:spPr>
+          <a:xfrm>
+            <a:off x="2110042" y="1825625"/>
+            <a:ext cx="7971916" cy="4351338"/>
+          </a:xfrm>
+          <a:prstGeom prst="rect">
+            <a:avLst/>
+          </a:prstGeom>
+        </p:spPr>
+      </p:pic>
+      <p:pic>
+        <p:nvPicPr>
+          <p:cNvPr id="2" name="Picture 1"/>
+          <p:cNvPicPr>
+            <a:picLocks noChangeAspect="1"/>
+          </p:cNvPicPr>
+          <p:nvPr/>
+        </p:nvPicPr>
+        <p:blipFill>
+          <a:blip r:embed="rId3"/>
+          <a:stretch>
+            <a:fillRect/>
+          </a:stretch>
+        </p:blipFill>
+        <p:spPr>
+          <a:xfrm>
+            <a:off x="2110042" y="1825625"/>
+            <a:ext cx="7971916" cy="4351337"/>
+          </a:xfrm>
+          <a:prstGeom prst="rect">
+            <a:avLst/>
+          </a:prstGeom>
+        </p:spPr>
+      </p:pic>
+      <p:pic>
+        <p:nvPicPr>
+          <p:cNvPr id="3" name="Picture 2"/>
+          <p:cNvPicPr>
+            <a:picLocks noChangeAspect="1"/>
+          </p:cNvPicPr>
+          <p:nvPr/>
+        </p:nvPicPr>
+        <p:blipFill>
+          <a:blip r:embed="rId4"/>
+          <a:stretch>
+            <a:fillRect/>
+          </a:stretch>
+        </p:blipFill>
+        <p:spPr>
+          <a:xfrm>
+            <a:off x="2110042" y="1825624"/>
+            <a:ext cx="7971918" cy="4351338"/>
+          </a:xfrm>
+          <a:prstGeom prst="rect">
+            <a:avLst/>
+          </a:prstGeom>
+        </p:spPr>
+      </p:pic>
+    </p:spTree>
+    <p:extLst>
+      <p:ext uri="{BB962C8B-B14F-4D97-AF65-F5344CB8AC3E}">
+        <p14:creationId xmlns:p14="http://schemas.microsoft.com/office/powerpoint/2010/main" val="2380606758"/>
+      </p:ext>
+    </p:extLst>
+  </p:cSld>
+  <p:clrMapOvr>
+    <a:masterClrMapping/>
+  </p:clrMapOvr>
+  <mc:AlternateContent xmlns:mc="http://schemas.openxmlformats.org/markup-compatibility/2006">
+    <mc:Choice xmlns:p14="http://schemas.microsoft.com/office/powerpoint/2010/main" Requires="p14">
+      <p:transition p14:dur="0"/>
+    </mc:Choice>
+    <mc:Fallback>
+      <p:transition/>
+    </mc:Fallback>
+  </mc:AlternateContent>
+  <p:timing>
+    <p:tnLst>
+      <p:par>
+        <p:cTn id="1" dur="indefinite" restart="never" nodeType="tmRoot"/>
+      </p:par>
+    </p:tnLst>
+  </p:timing>
+</p:sld>
+</file>
+
+<file path=ppt/slides/slide23.xml><?xml version="1.0" encoding="utf-8"?>
+<p:sld xmlns:a="http://schemas.openxmlformats.org/drawingml/2006/main" xmlns:r="http://schemas.openxmlformats.org/officeDocument/2006/relationships" xmlns:p="http://schemas.openxmlformats.org/presentationml/2006/main">
+  <p:cSld>
+    <p:spTree>
+      <p:nvGrpSpPr>
+        <p:cNvPr id="1" name=""/>
+        <p:cNvGrpSpPr/>
+        <p:nvPr/>
+      </p:nvGrpSpPr>
+      <p:grpSpPr>
+        <a:xfrm>
+          <a:off x="0" y="0"/>
+          <a:ext cx="0" cy="0"/>
+          <a:chOff x="0" y="0"/>
+          <a:chExt cx="0" cy="0"/>
+        </a:xfrm>
+      </p:grpSpPr>
+      <p:sp>
+        <p:nvSpPr>
+          <p:cNvPr id="2" name="Title 1"/>
+          <p:cNvSpPr>
+            <a:spLocks noGrp="1"/>
+          </p:cNvSpPr>
+          <p:nvPr>
+            <p:ph type="title"/>
+          </p:nvPr>
+        </p:nvSpPr>
+        <p:spPr/>
+        <p:txBody>
+          <a:bodyPr/>
+          <a:lstStyle/>
+          <a:p>
+            <a:r>
+              <a:rPr lang="en-GB" dirty="0" err="1" smtClean="0"/>
+              <a:t>Erm</a:t>
+            </a:r>
+            <a:r>
+              <a:rPr lang="en-GB" dirty="0" smtClean="0"/>
+              <a:t>…</a:t>
+            </a:r>
+            <a:endParaRPr lang="en-GB" dirty="0"/>
+          </a:p>
+        </p:txBody>
+      </p:sp>
+      <p:pic>
+        <p:nvPicPr>
+          <p:cNvPr id="4" name="Content Placeholder 3"/>
+          <p:cNvPicPr>
+            <a:picLocks noGrp="1" noChangeAspect="1"/>
+          </p:cNvPicPr>
+          <p:nvPr>
+            <p:ph idx="1"/>
+          </p:nvPr>
+        </p:nvPicPr>
+        <p:blipFill>
+          <a:blip r:embed="rId2"/>
+          <a:stretch>
+            <a:fillRect/>
+          </a:stretch>
+        </p:blipFill>
+        <p:spPr>
+          <a:xfrm>
+            <a:off x="2110042" y="1825625"/>
+            <a:ext cx="7971916" cy="4351338"/>
+          </a:xfrm>
+          <a:prstGeom prst="rect">
+            <a:avLst/>
+          </a:prstGeom>
+        </p:spPr>
+      </p:pic>
+    </p:spTree>
+    <p:extLst>
+      <p:ext uri="{BB962C8B-B14F-4D97-AF65-F5344CB8AC3E}">
+        <p14:creationId xmlns:p14="http://schemas.microsoft.com/office/powerpoint/2010/main" val="99474969"/>
+      </p:ext>
+    </p:extLst>
+  </p:cSld>
+  <p:clrMapOvr>
+    <a:masterClrMapping/>
+  </p:clrMapOvr>
+  <p:timing>
+    <p:tnLst>
+      <p:par>
+        <p:cTn id="1" dur="indefinite" restart="never" nodeType="tmRoot"/>
+      </p:par>
+    </p:tnLst>
+  </p:timing>
+</p:sld>
+</file>
+
+<file path=ppt/slides/slide24.xml><?xml version="1.0" encoding="utf-8"?>
+<p:sld xmlns:a="http://schemas.openxmlformats.org/drawingml/2006/main" xmlns:r="http://schemas.openxmlformats.org/officeDocument/2006/relationships" xmlns:p="http://schemas.openxmlformats.org/presentationml/2006/main">
+  <p:cSld>
+    <p:spTree>
+      <p:nvGrpSpPr>
+        <p:cNvPr id="1" name=""/>
+        <p:cNvGrpSpPr/>
+        <p:nvPr/>
+      </p:nvGrpSpPr>
+      <p:grpSpPr>
+        <a:xfrm>
+          <a:off x="0" y="0"/>
+          <a:ext cx="0" cy="0"/>
+          <a:chOff x="0" y="0"/>
+          <a:chExt cx="0" cy="0"/>
+        </a:xfrm>
+      </p:grpSpPr>
+      <p:sp>
+        <p:nvSpPr>
+          <p:cNvPr id="2" name="Title 1"/>
+          <p:cNvSpPr>
+            <a:spLocks noGrp="1"/>
+          </p:cNvSpPr>
+          <p:nvPr>
+            <p:ph type="title"/>
+          </p:nvPr>
+        </p:nvSpPr>
+        <p:spPr/>
+        <p:txBody>
+          <a:bodyPr>
+            <a:normAutofit/>
+          </a:bodyPr>
+          <a:lstStyle/>
+          <a:p>
+            <a:r>
+              <a:rPr lang="en-GB" sz="1800" dirty="0" smtClean="0"/>
+              <a:t>Moving swiftly on, here is the exception actually in use (the </a:t>
+            </a:r>
+            <a:r>
+              <a:rPr lang="en-GB" sz="1800" dirty="0" err="1"/>
+              <a:t>NullStrategyException</a:t>
+            </a:r>
+            <a:r>
+              <a:rPr lang="en-GB" sz="1800" dirty="0"/>
+              <a:t> </a:t>
+            </a:r>
+            <a:r>
+              <a:rPr lang="en-GB" sz="1800" dirty="0" smtClean="0"/>
+              <a:t>one)</a:t>
+            </a:r>
+            <a:endParaRPr lang="en-GB" sz="1800" dirty="0"/>
+          </a:p>
+        </p:txBody>
+      </p:sp>
+      <p:pic>
+        <p:nvPicPr>
+          <p:cNvPr id="5" name="Content Placeholder 4"/>
+          <p:cNvPicPr>
+            <a:picLocks noGrp="1" noChangeAspect="1"/>
+          </p:cNvPicPr>
+          <p:nvPr>
+            <p:ph idx="1"/>
+          </p:nvPr>
+        </p:nvPicPr>
+        <p:blipFill>
+          <a:blip r:embed="rId2"/>
+          <a:stretch>
+            <a:fillRect/>
+          </a:stretch>
+        </p:blipFill>
+        <p:spPr>
+          <a:xfrm>
+            <a:off x="2110042" y="1825625"/>
+            <a:ext cx="7971916" cy="4351338"/>
+          </a:xfrm>
+          <a:prstGeom prst="rect">
+            <a:avLst/>
+          </a:prstGeom>
+        </p:spPr>
+      </p:pic>
+    </p:spTree>
+    <p:extLst>
+      <p:ext uri="{BB962C8B-B14F-4D97-AF65-F5344CB8AC3E}">
+        <p14:creationId xmlns:p14="http://schemas.microsoft.com/office/powerpoint/2010/main" val="480968465"/>
+      </p:ext>
+    </p:extLst>
+  </p:cSld>
+  <p:clrMapOvr>
+    <a:masterClrMapping/>
+  </p:clrMapOvr>
+  <p:timing>
+    <p:tnLst>
+      <p:par>
+        <p:cTn id="1" dur="indefinite" restart="never" nodeType="tmRoot"/>
+      </p:par>
+    </p:tnLst>
+  </p:timing>
+</p:sld>
+</file>
+
+<file path=ppt/slides/slide25.xml><?xml version="1.0" encoding="utf-8"?>
+<p:sld xmlns:a="http://schemas.openxmlformats.org/drawingml/2006/main" xmlns:r="http://schemas.openxmlformats.org/officeDocument/2006/relationships" xmlns:p="http://schemas.openxmlformats.org/presentationml/2006/main">
+  <p:cSld>
+    <p:spTree>
+      <p:nvGrpSpPr>
+        <p:cNvPr id="1" name=""/>
+        <p:cNvGrpSpPr/>
+        <p:nvPr/>
+      </p:nvGrpSpPr>
+      <p:grpSpPr>
+        <a:xfrm>
+          <a:off x="0" y="0"/>
+          <a:ext cx="0" cy="0"/>
+          <a:chOff x="0" y="0"/>
+          <a:chExt cx="0" cy="0"/>
+        </a:xfrm>
+      </p:grpSpPr>
+      <p:sp>
+        <p:nvSpPr>
+          <p:cNvPr id="2" name="Title 1"/>
+          <p:cNvSpPr>
+            <a:spLocks noGrp="1"/>
+          </p:cNvSpPr>
+          <p:nvPr>
+            <p:ph type="title"/>
+          </p:nvPr>
+        </p:nvSpPr>
+        <p:spPr/>
+        <p:txBody>
+          <a:bodyPr>
+            <a:normAutofit/>
+          </a:bodyPr>
+          <a:lstStyle/>
+          <a:p>
+            <a:r>
+              <a:rPr lang="en-GB" sz="1800" dirty="0" smtClean="0"/>
+              <a:t>Oh whoops. Removing redundant code.</a:t>
+            </a:r>
+            <a:endParaRPr lang="en-GB" sz="1800" dirty="0"/>
+          </a:p>
+        </p:txBody>
+      </p:sp>
+      <p:pic>
+        <p:nvPicPr>
+          <p:cNvPr id="6" name="Content Placeholder 5"/>
+          <p:cNvPicPr>
+            <a:picLocks noGrp="1" noChangeAspect="1"/>
+          </p:cNvPicPr>
+          <p:nvPr>
+            <p:ph idx="1"/>
+          </p:nvPr>
+        </p:nvPicPr>
+        <p:blipFill>
+          <a:blip r:embed="rId2"/>
+          <a:stretch>
+            <a:fillRect/>
+          </a:stretch>
+        </p:blipFill>
+        <p:spPr>
+          <a:xfrm>
+            <a:off x="2110042" y="1825625"/>
+            <a:ext cx="7971916" cy="4351338"/>
+          </a:xfrm>
+          <a:prstGeom prst="rect">
+            <a:avLst/>
+          </a:prstGeom>
+        </p:spPr>
+      </p:pic>
+    </p:spTree>
+    <p:extLst>
+      <p:ext uri="{BB962C8B-B14F-4D97-AF65-F5344CB8AC3E}">
+        <p14:creationId xmlns:p14="http://schemas.microsoft.com/office/powerpoint/2010/main" val="1955635688"/>
       </p:ext>
     </p:extLst>
   </p:cSld>
@@ -3847,11 +5713,7 @@
             </a:r>
             <a:r>
               <a:rPr lang="en-GB" sz="2400" dirty="0" smtClean="0"/>
-              <a:t> namespace </a:t>
-            </a:r>
-            <a:r>
-              <a:rPr lang="en-GB" sz="2400" dirty="0" smtClean="0"/>
-              <a:t>(to keep it neat).</a:t>
+              <a:t> namespace (to keep it neat).</a:t>
             </a:r>
           </a:p>
           <a:p>

</xml_diff>